<commit_message>
Add Lecture 4,5,6 ppt and Lecture 6 in-class files
</commit_message>
<xml_diff>
--- a/Lecture 4/lecture4.pptx
+++ b/Lecture 4/lecture4.pptx
@@ -140,7 +140,7 @@
   </p:defaultTextStyle>
   <p:extLst>
     <p:ext uri="{EFAFB233-063F-42B5-8137-9DF3F51BA10A}">
-      <p15:sldGuideLst xmlns:p15="http://schemas.microsoft.com/office/powerpoint/2012/main" xmlns="">
+      <p15:sldGuideLst xmlns="" xmlns:p15="http://schemas.microsoft.com/office/powerpoint/2012/main">
         <p15:guide id="1" orient="horz" pos="2160" userDrawn="1">
           <p15:clr>
             <a:srgbClr val="A4A3A4"/>
@@ -154,7 +154,7 @@
       </p15:sldGuideLst>
     </p:ext>
     <p:ext uri="{2D200454-40CA-4A62-9FC3-DE9A4176ACB9}">
-      <p15:notesGuideLst xmlns:p15="http://schemas.microsoft.com/office/powerpoint/2012/main" xmlns="">
+      <p15:notesGuideLst xmlns="" xmlns:p15="http://schemas.microsoft.com/office/powerpoint/2012/main">
         <p15:guide id="1" orient="horz" pos="2880">
           <p15:clr>
             <a:srgbClr val="A4A3A4"/>
@@ -254,7 +254,7 @@
             <a:fld id="{B4B40DF5-17F0-43C5-A7AE-65A758E8AB63}" type="datetimeFigureOut">
               <a:rPr lang="nl-NL" smtClean="0"/>
               <a:pPr/>
-              <a:t>2/24/21</a:t>
+              <a:t>3/2/21</a:t>
             </a:fld>
             <a:endParaRPr lang="nl-NL"/>
           </a:p>
@@ -420,7 +420,7 @@
           <a:p>
             <a:fld id="{A93D6BD4-2A44-460F-8349-CDAFC499EC45}" type="datetimeFigureOut">
               <a:rPr lang="en-US" smtClean="0"/>
-              <a:t>2/24/21</a:t>
+              <a:t>3/2/21</a:t>
             </a:fld>
             <a:endParaRPr lang="en-US"/>
           </a:p>
@@ -4030,15 +4030,7 @@
                   <a:srgbClr val="FFFF00"/>
                 </a:solidFill>
               </a:rPr>
-              <a:t>[Darren note] In while loop, you must declar</a:t>
-            </a:r>
-            <a:r>
-              <a:rPr lang="en-US" sz="1600" dirty="0" smtClean="0">
-                <a:solidFill>
-                  <a:srgbClr val="FFFF00"/>
-                </a:solidFill>
-              </a:rPr>
-              <a:t>e the counter outside of the scope of the loop.  This is just the nature of the loop structure. It also means that the variable can be used outside of the loop later on.</a:t>
+              <a:t>[Darren note] In while loop, you must declare the counter outside of the scope of the loop.  This is just the nature of the loop structure. It also means that the variable can be used outside of the loop later on.</a:t>
             </a:r>
             <a:endParaRPr lang="en-US" sz="1600" dirty="0">
               <a:solidFill>
@@ -4524,17 +4516,10 @@
                 <a:latin typeface="Courier New" panose="02070309020205020404" pitchFamily="49" charset="0"/>
                 <a:cs typeface="Courier New" panose="02070309020205020404" pitchFamily="49" charset="0"/>
               </a:rPr>
-              <a:t>('Number must be </a:t>
-            </a:r>
-            <a:r>
-              <a:rPr lang="en-US" sz="1600">
-                <a:latin typeface="Courier New" panose="02070309020205020404" pitchFamily="49" charset="0"/>
-                <a:cs typeface="Courier New" panose="02070309020205020404" pitchFamily="49" charset="0"/>
-              </a:rPr>
-              <a:t>between </a:t>
-            </a:r>
-            <a:r>
-              <a:rPr lang="en-US" sz="1600" smtClean="0">
+              <a:t>('Number must be between </a:t>
+            </a:r>
+            <a:r>
+              <a:rPr lang="en-US" sz="1600" dirty="0" smtClean="0">
                 <a:latin typeface="Courier New" panose="02070309020205020404" pitchFamily="49" charset="0"/>
                 <a:cs typeface="Courier New" panose="02070309020205020404" pitchFamily="49" charset="0"/>
               </a:rPr>
@@ -4588,14 +4573,24 @@
                 <a:latin typeface="Courier New" panose="02070309020205020404" pitchFamily="49" charset="0"/>
                 <a:cs typeface="Courier New" panose="02070309020205020404" pitchFamily="49" charset="0"/>
               </a:rPr>
-              <a:t>;font-size</a:t>
+              <a:t>;font-size:</a:t>
             </a:r>
             <a:r>
               <a:rPr lang="en-US" sz="1600" dirty="0" smtClean="0">
                 <a:latin typeface="Courier New" panose="02070309020205020404" pitchFamily="49" charset="0"/>
                 <a:cs typeface="Courier New" panose="02070309020205020404" pitchFamily="49" charset="0"/>
               </a:rPr>
-              <a:t>:1.2em</a:t>
+              <a:t>1.2em</a:t>
+            </a:r>
+            <a:r>
+              <a:rPr lang="en-US" sz="1600" dirty="0" smtClean="0">
+                <a:solidFill>
+                  <a:srgbClr val="FF0000"/>
+                </a:solidFill>
+                <a:latin typeface="Courier New" panose="02070309020205020404" pitchFamily="49" charset="0"/>
+                <a:cs typeface="Courier New" panose="02070309020205020404" pitchFamily="49" charset="0"/>
+              </a:rPr>
+              <a:t>;</a:t>
             </a:r>
             <a:r>
               <a:rPr lang="en-US" sz="1600" dirty="0" smtClean="0">
@@ -4631,7 +4626,7 @@
                 <a:latin typeface="Courier New" panose="02070309020205020404" pitchFamily="49" charset="0"/>
                 <a:cs typeface="Courier New" panose="02070309020205020404" pitchFamily="49" charset="0"/>
               </a:rPr>
-              <a:t>The console formatting only works with a template literal syntax. </a:t>
+              <a:t>The console formatting only works with a template literal syntax. %c invokes the style editor(?), then you can add in CSS as the second argument</a:t>
             </a:r>
             <a:r>
               <a:rPr lang="en-US" sz="1600" dirty="0" smtClean="0">
@@ -4641,7 +4636,57 @@
                 <a:latin typeface="Courier New" panose="02070309020205020404" pitchFamily="49" charset="0"/>
                 <a:cs typeface="Courier New" panose="02070309020205020404" pitchFamily="49" charset="0"/>
               </a:rPr>
-              <a:t>%c invokes the style editor(?), then you can add in CSS as the second argument.</a:t>
+              <a:t>. </a:t>
+            </a:r>
+            <a:r>
+              <a:rPr lang="en-US" sz="1600" dirty="0" smtClean="0">
+                <a:solidFill>
+                  <a:srgbClr val="FFFF00"/>
+                </a:solidFill>
+                <a:latin typeface="Courier New" panose="02070309020205020404" pitchFamily="49" charset="0"/>
+                <a:cs typeface="Courier New" panose="02070309020205020404" pitchFamily="49" charset="0"/>
+              </a:rPr>
+              <a:t>I added a statement terminator (see in </a:t>
+            </a:r>
+            <a:r>
+              <a:rPr lang="en-US" sz="1600" dirty="0" smtClean="0">
+                <a:solidFill>
+                  <a:srgbClr val="FF0000"/>
+                </a:solidFill>
+                <a:latin typeface="Courier New" panose="02070309020205020404" pitchFamily="49" charset="0"/>
+                <a:cs typeface="Courier New" panose="02070309020205020404" pitchFamily="49" charset="0"/>
+              </a:rPr>
+              <a:t>red </a:t>
+            </a:r>
+            <a:r>
+              <a:rPr lang="en-US" sz="1600" dirty="0" smtClean="0">
+                <a:solidFill>
+                  <a:srgbClr val="FFFF00"/>
+                </a:solidFill>
+                <a:latin typeface="Courier New" panose="02070309020205020404" pitchFamily="49" charset="0"/>
+                <a:cs typeface="Courier New" panose="02070309020205020404" pitchFamily="49" charset="0"/>
+              </a:rPr>
+              <a:t>above), but it apparently works even if it’s not there after the last </a:t>
+            </a:r>
+            <a:r>
+              <a:rPr lang="en-US" sz="1600" dirty="0" err="1" smtClean="0">
+                <a:solidFill>
+                  <a:srgbClr val="FFFF00"/>
+                </a:solidFill>
+                <a:latin typeface="Courier New" panose="02070309020205020404" pitchFamily="49" charset="0"/>
+                <a:cs typeface="Courier New" panose="02070309020205020404" pitchFamily="49" charset="0"/>
+              </a:rPr>
+              <a:t>css</a:t>
+            </a:r>
+            <a:r>
+              <a:rPr lang="en-US" sz="1600" dirty="0" smtClean="0">
+                <a:solidFill>
+                  <a:srgbClr val="FFFF00"/>
+                </a:solidFill>
+                <a:latin typeface="Courier New" panose="02070309020205020404" pitchFamily="49" charset="0"/>
+                <a:cs typeface="Courier New" panose="02070309020205020404" pitchFamily="49" charset="0"/>
+              </a:rPr>
+              <a:t> statement.</a:t>
             </a:r>
             <a:endParaRPr lang="en-US" sz="1600" dirty="0">
               <a:solidFill>

</xml_diff>